<commit_message>
Added tee support to CMD execution
</commit_message>
<xml_diff>
--- a/presentation/mine2sirius.pptx
+++ b/presentation/mine2sirius.pptx
@@ -6,10 +6,10 @@
     <p:sldMasterId id="2147485900" r:id="rId5"/>
   </p:sldMasterIdLst>
   <p:notesMasterIdLst>
-    <p:notesMasterId r:id="rId27"/>
+    <p:notesMasterId r:id="rId29"/>
   </p:notesMasterIdLst>
   <p:handoutMasterIdLst>
-    <p:handoutMasterId r:id="rId28"/>
+    <p:handoutMasterId r:id="rId30"/>
   </p:handoutMasterIdLst>
   <p:sldIdLst>
     <p:sldId id="760" r:id="rId6"/>
@@ -31,8 +31,10 @@
     <p:sldId id="830" r:id="rId22"/>
     <p:sldId id="831" r:id="rId23"/>
     <p:sldId id="832" r:id="rId24"/>
-    <p:sldId id="833" r:id="rId25"/>
-    <p:sldId id="788" r:id="rId26"/>
+    <p:sldId id="834" r:id="rId25"/>
+    <p:sldId id="833" r:id="rId26"/>
+    <p:sldId id="835" r:id="rId27"/>
+    <p:sldId id="788" r:id="rId28"/>
   </p:sldIdLst>
   <p:sldSz cx="9144000" cy="5143500" type="screen16x9"/>
   <p:notesSz cx="6819900" cy="9918700"/>
@@ -1105,7 +1107,7 @@
               <a:pPr>
                 <a:defRPr/>
               </a:pPr>
-              <a:t>21</a:t>
+              <a:t>23</a:t>
             </a:fld>
             <a:endParaRPr lang="de-DE"/>
           </a:p>
@@ -4640,7 +4642,7 @@
           </a:p>
           <a:p>
             <a:r>
-              <a:rPr lang="en-GB"/>
+              <a:rPr lang="en-GB" dirty="0"/>
               <a:t>Annotations (.csv)</a:t>
             </a:r>
           </a:p>
@@ -4748,6 +4750,125 @@
   <p:cSld>
     <p:spTree>
       <p:nvGrpSpPr>
+        <p:cNvPr id="1" name=""/>
+        <p:cNvGrpSpPr/>
+        <p:nvPr/>
+      </p:nvGrpSpPr>
+      <p:grpSpPr>
+        <a:xfrm>
+          <a:off x="0" y="0"/>
+          <a:ext cx="0" cy="0"/>
+          <a:chOff x="0" y="0"/>
+          <a:chExt cx="0" cy="0"/>
+        </a:xfrm>
+      </p:grpSpPr>
+      <p:sp>
+        <p:nvSpPr>
+          <p:cNvPr id="2" name="Content Placeholder 1">
+            <a:extLst>
+              <a:ext uri="{FF2B5EF4-FFF2-40B4-BE49-F238E27FC236}">
+                <a16:creationId xmlns:a16="http://schemas.microsoft.com/office/drawing/2014/main" id="{C7210F49-858F-FD75-5E08-0287AD510CF3}"/>
+              </a:ext>
+            </a:extLst>
+          </p:cNvPr>
+          <p:cNvSpPr>
+            <a:spLocks noGrp="1"/>
+          </p:cNvSpPr>
+          <p:nvPr>
+            <p:ph sz="quarter" idx="10"/>
+          </p:nvPr>
+        </p:nvSpPr>
+        <p:spPr/>
+        <p:txBody>
+          <a:bodyPr/>
+          <a:lstStyle/>
+          <a:p>
+            <a:r>
+              <a:rPr lang="en-GB" dirty="0"/>
+              <a:t>Annotation</a:t>
+            </a:r>
+            <a:endParaRPr lang="en-DE" dirty="0"/>
+          </a:p>
+        </p:txBody>
+      </p:sp>
+      <p:sp>
+        <p:nvSpPr>
+          <p:cNvPr id="3" name="Text Placeholder 2">
+            <a:extLst>
+              <a:ext uri="{FF2B5EF4-FFF2-40B4-BE49-F238E27FC236}">
+                <a16:creationId xmlns:a16="http://schemas.microsoft.com/office/drawing/2014/main" id="{BE40945A-D4A2-7CC6-D4BD-B907B6EACF5E}"/>
+              </a:ext>
+            </a:extLst>
+          </p:cNvPr>
+          <p:cNvSpPr>
+            <a:spLocks noGrp="1"/>
+          </p:cNvSpPr>
+          <p:nvPr>
+            <p:ph type="body" sz="quarter" idx="11"/>
+          </p:nvPr>
+        </p:nvSpPr>
+        <p:spPr>
+          <a:xfrm>
+            <a:off x="1260000" y="1634400"/>
+            <a:ext cx="7596000" cy="1415772"/>
+          </a:xfrm>
+        </p:spPr>
+        <p:txBody>
+          <a:bodyPr/>
+          <a:lstStyle/>
+          <a:p>
+            <a:r>
+              <a:rPr lang="en-GB" dirty="0"/>
+              <a:t>Custom DB (iML1515)</a:t>
+            </a:r>
+          </a:p>
+          <a:p>
+            <a:r>
+              <a:rPr lang="en-GB" dirty="0"/>
+              <a:t>GNPS</a:t>
+            </a:r>
+          </a:p>
+          <a:p>
+            <a:r>
+              <a:rPr lang="en-GB" dirty="0"/>
+              <a:t>SIRIUS</a:t>
+            </a:r>
+          </a:p>
+          <a:p>
+            <a:r>
+              <a:rPr lang="en-GB" dirty="0"/>
+              <a:t>SIRIUS-</a:t>
+            </a:r>
+            <a:r>
+              <a:rPr lang="en-GB" dirty="0" err="1"/>
+              <a:t>ClassyFire</a:t>
+            </a:r>
+            <a:r>
+              <a:rPr lang="en-GB" dirty="0"/>
+              <a:t> classes</a:t>
+            </a:r>
+            <a:endParaRPr lang="en-DE" dirty="0"/>
+          </a:p>
+        </p:txBody>
+      </p:sp>
+    </p:spTree>
+    <p:extLst>
+      <p:ext uri="{BB962C8B-B14F-4D97-AF65-F5344CB8AC3E}">
+        <p14:creationId xmlns:p14="http://schemas.microsoft.com/office/powerpoint/2010/main" val="1236610907"/>
+      </p:ext>
+    </p:extLst>
+  </p:cSld>
+  <p:clrMapOvr>
+    <a:masterClrMapping/>
+  </p:clrMapOvr>
+</p:sld>
+</file>
+
+<file path=ppt/slides/slide21.xml><?xml version="1.0" encoding="utf-8"?>
+<p:sld xmlns:a="http://schemas.openxmlformats.org/drawingml/2006/main" xmlns:r="http://schemas.openxmlformats.org/officeDocument/2006/relationships" xmlns:p="http://schemas.openxmlformats.org/presentationml/2006/main">
+  <p:cSld>
+    <p:spTree>
+      <p:nvGrpSpPr>
         <p:cNvPr id="1" name="">
           <a:extLst>
             <a:ext uri="{FF2B5EF4-FFF2-40B4-BE49-F238E27FC236}">
@@ -4787,7 +4908,11 @@
           <a:bodyPr/>
           <a:lstStyle/>
           <a:p>
-            <a:endParaRPr lang="en-DE"/>
+            <a:r>
+              <a:rPr lang="en-GB" dirty="0"/>
+              <a:t>Feature differences</a:t>
+            </a:r>
+            <a:endParaRPr lang="en-DE" dirty="0"/>
           </a:p>
         </p:txBody>
       </p:sp>
@@ -4812,10 +4937,45 @@
           <a:bodyPr/>
           <a:lstStyle/>
           <a:p>
-            <a:endParaRPr lang="en-DE"/>
+            <a:endParaRPr lang="en-DE" dirty="0"/>
           </a:p>
         </p:txBody>
       </p:sp>
+      <p:pic>
+        <p:nvPicPr>
+          <p:cNvPr id="5" name="Picture 4" descr="A white and pink background&#10;&#10;Description automatically generated with medium confidence">
+            <a:extLst>
+              <a:ext uri="{FF2B5EF4-FFF2-40B4-BE49-F238E27FC236}">
+                <a16:creationId xmlns:a16="http://schemas.microsoft.com/office/drawing/2014/main" id="{897B85CA-45B1-78BB-8D0B-113C995847EC}"/>
+              </a:ext>
+            </a:extLst>
+          </p:cNvPr>
+          <p:cNvPicPr>
+            <a:picLocks noChangeAspect="1"/>
+          </p:cNvPicPr>
+          <p:nvPr/>
+        </p:nvPicPr>
+        <p:blipFill>
+          <a:blip r:embed="rId2">
+            <a:extLst>
+              <a:ext uri="{28A0092B-C50C-407E-A947-70E740481C1C}">
+                <a14:useLocalDpi xmlns:a14="http://schemas.microsoft.com/office/drawing/2010/main" val="0"/>
+              </a:ext>
+            </a:extLst>
+          </a:blip>
+          <a:srcRect l="2609" t="10700"/>
+          <a:stretch/>
+        </p:blipFill>
+        <p:spPr>
+          <a:xfrm>
+            <a:off x="1958716" y="1634400"/>
+            <a:ext cx="6198568" cy="3233933"/>
+          </a:xfrm>
+          <a:prstGeom prst="rect">
+            <a:avLst/>
+          </a:prstGeom>
+        </p:spPr>
+      </p:pic>
     </p:spTree>
     <p:extLst>
       <p:ext uri="{BB962C8B-B14F-4D97-AF65-F5344CB8AC3E}">
@@ -4829,7 +4989,142 @@
 </p:sld>
 </file>
 
-<file path=ppt/slides/slide21.xml><?xml version="1.0" encoding="utf-8"?>
+<file path=ppt/slides/slide22.xml><?xml version="1.0" encoding="utf-8"?>
+<p:sld xmlns:a="http://schemas.openxmlformats.org/drawingml/2006/main" xmlns:r="http://schemas.openxmlformats.org/officeDocument/2006/relationships" xmlns:p="http://schemas.openxmlformats.org/presentationml/2006/main">
+  <p:cSld>
+    <p:spTree>
+      <p:nvGrpSpPr>
+        <p:cNvPr id="1" name="">
+          <a:extLst>
+            <a:ext uri="{FF2B5EF4-FFF2-40B4-BE49-F238E27FC236}">
+              <a16:creationId xmlns:a16="http://schemas.microsoft.com/office/drawing/2014/main" id="{5FD37D95-7E90-0BD4-3EF2-D88B8A714D7A}"/>
+            </a:ext>
+          </a:extLst>
+        </p:cNvPr>
+        <p:cNvGrpSpPr/>
+        <p:nvPr/>
+      </p:nvGrpSpPr>
+      <p:grpSpPr>
+        <a:xfrm>
+          <a:off x="0" y="0"/>
+          <a:ext cx="0" cy="0"/>
+          <a:chOff x="0" y="0"/>
+          <a:chExt cx="0" cy="0"/>
+        </a:xfrm>
+      </p:grpSpPr>
+      <p:sp>
+        <p:nvSpPr>
+          <p:cNvPr id="2" name="Content Placeholder 1">
+            <a:extLst>
+              <a:ext uri="{FF2B5EF4-FFF2-40B4-BE49-F238E27FC236}">
+                <a16:creationId xmlns:a16="http://schemas.microsoft.com/office/drawing/2014/main" id="{013EB7E3-2EFB-3D21-A49F-4433AE520837}"/>
+              </a:ext>
+            </a:extLst>
+          </p:cNvPr>
+          <p:cNvSpPr>
+            <a:spLocks noGrp="1"/>
+          </p:cNvSpPr>
+          <p:nvPr>
+            <p:ph sz="quarter" idx="10"/>
+          </p:nvPr>
+        </p:nvSpPr>
+        <p:spPr/>
+        <p:txBody>
+          <a:bodyPr/>
+          <a:lstStyle/>
+          <a:p>
+            <a:r>
+              <a:rPr lang="en-GB" dirty="0"/>
+              <a:t>Feature differences</a:t>
+            </a:r>
+            <a:endParaRPr lang="en-DE" dirty="0"/>
+          </a:p>
+        </p:txBody>
+      </p:sp>
+      <p:pic>
+        <p:nvPicPr>
+          <p:cNvPr id="6" name="Picture 5" descr="A graph of a diagram&#10;&#10;Description automatically generated with medium confidence">
+            <a:extLst>
+              <a:ext uri="{FF2B5EF4-FFF2-40B4-BE49-F238E27FC236}">
+                <a16:creationId xmlns:a16="http://schemas.microsoft.com/office/drawing/2014/main" id="{B7BEE0E1-4129-CBCF-DB41-34F5180FE593}"/>
+              </a:ext>
+            </a:extLst>
+          </p:cNvPr>
+          <p:cNvPicPr>
+            <a:picLocks noChangeAspect="1"/>
+          </p:cNvPicPr>
+          <p:nvPr/>
+        </p:nvPicPr>
+        <p:blipFill>
+          <a:blip r:embed="rId2">
+            <a:extLst>
+              <a:ext uri="{28A0092B-C50C-407E-A947-70E740481C1C}">
+                <a14:useLocalDpi xmlns:a14="http://schemas.microsoft.com/office/drawing/2010/main" val="0"/>
+              </a:ext>
+            </a:extLst>
+          </a:blip>
+          <a:srcRect l="1986" t="10515" r="4220" b="7591"/>
+          <a:stretch/>
+        </p:blipFill>
+        <p:spPr>
+          <a:xfrm>
+            <a:off x="2195017" y="1517366"/>
+            <a:ext cx="5723465" cy="1599423"/>
+          </a:xfrm>
+          <a:prstGeom prst="rect">
+            <a:avLst/>
+          </a:prstGeom>
+        </p:spPr>
+      </p:pic>
+      <p:pic>
+        <p:nvPicPr>
+          <p:cNvPr id="8" name="Picture 7" descr="A graph showing a diagram&#10;&#10;Description automatically generated with medium confidence">
+            <a:extLst>
+              <a:ext uri="{FF2B5EF4-FFF2-40B4-BE49-F238E27FC236}">
+                <a16:creationId xmlns:a16="http://schemas.microsoft.com/office/drawing/2014/main" id="{9BE11932-2D13-D6D6-A3F2-A03DD8586A45}"/>
+              </a:ext>
+            </a:extLst>
+          </p:cNvPr>
+          <p:cNvPicPr>
+            <a:picLocks noChangeAspect="1"/>
+          </p:cNvPicPr>
+          <p:nvPr/>
+        </p:nvPicPr>
+        <p:blipFill>
+          <a:blip r:embed="rId3">
+            <a:extLst>
+              <a:ext uri="{28A0092B-C50C-407E-A947-70E740481C1C}">
+                <a14:useLocalDpi xmlns:a14="http://schemas.microsoft.com/office/drawing/2010/main" val="0"/>
+              </a:ext>
+            </a:extLst>
+          </a:blip>
+          <a:srcRect l="1166" t="9535" r="4663" b="4964"/>
+          <a:stretch/>
+        </p:blipFill>
+        <p:spPr>
+          <a:xfrm>
+            <a:off x="2195017" y="3116789"/>
+            <a:ext cx="5723465" cy="1663190"/>
+          </a:xfrm>
+          <a:prstGeom prst="rect">
+            <a:avLst/>
+          </a:prstGeom>
+        </p:spPr>
+      </p:pic>
+    </p:spTree>
+    <p:extLst>
+      <p:ext uri="{BB962C8B-B14F-4D97-AF65-F5344CB8AC3E}">
+        <p14:creationId xmlns:p14="http://schemas.microsoft.com/office/powerpoint/2010/main" val="3730293367"/>
+      </p:ext>
+    </p:extLst>
+  </p:cSld>
+  <p:clrMapOvr>
+    <a:masterClrMapping/>
+  </p:clrMapOvr>
+</p:sld>
+</file>
+
+<file path=ppt/slides/slide23.xml><?xml version="1.0" encoding="utf-8"?>
 <p:sld xmlns:a="http://schemas.openxmlformats.org/drawingml/2006/main" xmlns:r="http://schemas.openxmlformats.org/officeDocument/2006/relationships" xmlns:p="http://schemas.openxmlformats.org/presentationml/2006/main">
   <p:cSld>
     <p:spTree>

</xml_diff>